<commit_message>
Week 6 slides updated
</commit_message>
<xml_diff>
--- a/slides/cds431_week6_1.pptx
+++ b/slides/cds431_week6_1.pptx
@@ -5521,7 +5521,7 @@
           <a:p>
             <a:fld id="{80DFBE8B-2C1E-F24E-8EEF-67451472D0B1}" type="datetimeFigureOut">
               <a:rPr lang="en-US" smtClean="0"/>
-              <a:t>1/11/22</a:t>
+              <a:t>4/28/22</a:t>
             </a:fld>
             <a:endParaRPr lang="en-US"/>
           </a:p>
@@ -6291,7 +6291,7 @@
           <a:p>
             <a:fld id="{07D73A2E-5CA9-2F4B-8F03-43814F7B86AC}" type="datetimeFigureOut">
               <a:rPr lang="en-US" smtClean="0"/>
-              <a:t>1/11/22</a:t>
+              <a:t>4/28/22</a:t>
             </a:fld>
             <a:endParaRPr lang="en-US"/>
           </a:p>
@@ -6489,7 +6489,7 @@
           <a:p>
             <a:fld id="{07D73A2E-5CA9-2F4B-8F03-43814F7B86AC}" type="datetimeFigureOut">
               <a:rPr lang="en-US" smtClean="0"/>
-              <a:t>1/11/22</a:t>
+              <a:t>4/28/22</a:t>
             </a:fld>
             <a:endParaRPr lang="en-US"/>
           </a:p>
@@ -6697,7 +6697,7 @@
           <a:p>
             <a:fld id="{07D73A2E-5CA9-2F4B-8F03-43814F7B86AC}" type="datetimeFigureOut">
               <a:rPr lang="en-US" smtClean="0"/>
-              <a:t>1/11/22</a:t>
+              <a:t>4/28/22</a:t>
             </a:fld>
             <a:endParaRPr lang="en-US"/>
           </a:p>
@@ -6895,7 +6895,7 @@
           <a:p>
             <a:fld id="{07D73A2E-5CA9-2F4B-8F03-43814F7B86AC}" type="datetimeFigureOut">
               <a:rPr lang="en-US" smtClean="0"/>
-              <a:t>1/11/22</a:t>
+              <a:t>4/28/22</a:t>
             </a:fld>
             <a:endParaRPr lang="en-US"/>
           </a:p>
@@ -7170,7 +7170,7 @@
           <a:p>
             <a:fld id="{07D73A2E-5CA9-2F4B-8F03-43814F7B86AC}" type="datetimeFigureOut">
               <a:rPr lang="en-US" smtClean="0"/>
-              <a:t>1/11/22</a:t>
+              <a:t>4/28/22</a:t>
             </a:fld>
             <a:endParaRPr lang="en-US"/>
           </a:p>
@@ -7435,7 +7435,7 @@
           <a:p>
             <a:fld id="{07D73A2E-5CA9-2F4B-8F03-43814F7B86AC}" type="datetimeFigureOut">
               <a:rPr lang="en-US" smtClean="0"/>
-              <a:t>1/11/22</a:t>
+              <a:t>4/28/22</a:t>
             </a:fld>
             <a:endParaRPr lang="en-US"/>
           </a:p>
@@ -7847,7 +7847,7 @@
           <a:p>
             <a:fld id="{07D73A2E-5CA9-2F4B-8F03-43814F7B86AC}" type="datetimeFigureOut">
               <a:rPr lang="en-US" smtClean="0"/>
-              <a:t>1/11/22</a:t>
+              <a:t>4/28/22</a:t>
             </a:fld>
             <a:endParaRPr lang="en-US"/>
           </a:p>
@@ -7988,7 +7988,7 @@
           <a:p>
             <a:fld id="{07D73A2E-5CA9-2F4B-8F03-43814F7B86AC}" type="datetimeFigureOut">
               <a:rPr lang="en-US" smtClean="0"/>
-              <a:t>1/11/22</a:t>
+              <a:t>4/28/22</a:t>
             </a:fld>
             <a:endParaRPr lang="en-US"/>
           </a:p>
@@ -8101,7 +8101,7 @@
           <a:p>
             <a:fld id="{07D73A2E-5CA9-2F4B-8F03-43814F7B86AC}" type="datetimeFigureOut">
               <a:rPr lang="en-US" smtClean="0"/>
-              <a:t>1/11/22</a:t>
+              <a:t>4/28/22</a:t>
             </a:fld>
             <a:endParaRPr lang="en-US"/>
           </a:p>
@@ -8412,7 +8412,7 @@
           <a:p>
             <a:fld id="{07D73A2E-5CA9-2F4B-8F03-43814F7B86AC}" type="datetimeFigureOut">
               <a:rPr lang="en-US" smtClean="0"/>
-              <a:t>1/11/22</a:t>
+              <a:t>4/28/22</a:t>
             </a:fld>
             <a:endParaRPr lang="en-US"/>
           </a:p>
@@ -8700,7 +8700,7 @@
           <a:p>
             <a:fld id="{07D73A2E-5CA9-2F4B-8F03-43814F7B86AC}" type="datetimeFigureOut">
               <a:rPr lang="en-US" smtClean="0"/>
-              <a:t>1/11/22</a:t>
+              <a:t>4/28/22</a:t>
             </a:fld>
             <a:endParaRPr lang="en-US"/>
           </a:p>
@@ -8971,7 +8971,7 @@
           <a:p>
             <a:fld id="{07D73A2E-5CA9-2F4B-8F03-43814F7B86AC}" type="datetimeFigureOut">
               <a:rPr lang="en-US" smtClean="0"/>
-              <a:t>1/11/22</a:t>
+              <a:t>4/28/22</a:t>
             </a:fld>
             <a:endParaRPr lang="en-US"/>
           </a:p>
@@ -15093,6 +15093,45 @@
           </a:p>
         </p:txBody>
       </p:sp>
+      <p:sp>
+        <p:nvSpPr>
+          <p:cNvPr id="3" name="TextBox 2">
+            <a:extLst>
+              <a:ext uri="{FF2B5EF4-FFF2-40B4-BE49-F238E27FC236}">
+                <a16:creationId xmlns:a16="http://schemas.microsoft.com/office/drawing/2014/main" id="{9E0D1FD3-FA5B-0FCE-84CD-5C1672E9B28F}"/>
+              </a:ext>
+            </a:extLst>
+          </p:cNvPr>
+          <p:cNvSpPr txBox="1"/>
+          <p:nvPr/>
+        </p:nvSpPr>
+        <p:spPr>
+          <a:xfrm>
+            <a:off x="10496675" y="1953055"/>
+            <a:ext cx="1525992" cy="2585323"/>
+          </a:xfrm>
+          <a:prstGeom prst="rect">
+            <a:avLst/>
+          </a:prstGeom>
+          <a:noFill/>
+        </p:spPr>
+        <p:txBody>
+          <a:bodyPr wrap="square" rtlCol="0">
+            <a:spAutoFit/>
+          </a:bodyPr>
+          <a:lstStyle/>
+          <a:p>
+            <a:r>
+              <a:rPr lang="en-US" dirty="0">
+                <a:solidFill>
+                  <a:srgbClr val="FF0000"/>
+                </a:solidFill>
+              </a:rPr>
+              <a:t>Protocols: A set of rules, such as the scoring booklet/form for a test or a form for recording responses</a:t>
+            </a:r>
+          </a:p>
+        </p:txBody>
+      </p:sp>
     </p:spTree>
     <p:extLst>
       <p:ext uri="{BB962C8B-B14F-4D97-AF65-F5344CB8AC3E}">
@@ -15227,6 +15266,45 @@
             <a:r>
               <a:rPr lang="en-US" dirty="0"/>
               <a:t>, Matthew will include the final sounds /s/ and /z/ when producing words ending with two consonant sounds, with 80% accuracy (given at least 10 opportunities).</a:t>
+            </a:r>
+          </a:p>
+        </p:txBody>
+      </p:sp>
+      <p:sp>
+        <p:nvSpPr>
+          <p:cNvPr id="4" name="TextBox 3">
+            <a:extLst>
+              <a:ext uri="{FF2B5EF4-FFF2-40B4-BE49-F238E27FC236}">
+                <a16:creationId xmlns:a16="http://schemas.microsoft.com/office/drawing/2014/main" id="{CE1024E3-FDAF-3154-586A-27D25E38A401}"/>
+              </a:ext>
+            </a:extLst>
+          </p:cNvPr>
+          <p:cNvSpPr txBox="1"/>
+          <p:nvPr/>
+        </p:nvSpPr>
+        <p:spPr>
+          <a:xfrm>
+            <a:off x="135467" y="2384454"/>
+            <a:ext cx="2178755" cy="3416320"/>
+          </a:xfrm>
+          <a:prstGeom prst="rect">
+            <a:avLst/>
+          </a:prstGeom>
+          <a:noFill/>
+        </p:spPr>
+        <p:txBody>
+          <a:bodyPr wrap="square" rtlCol="0">
+            <a:spAutoFit/>
+          </a:bodyPr>
+          <a:lstStyle/>
+          <a:p>
+            <a:r>
+              <a:rPr lang="en-US" dirty="0">
+                <a:solidFill>
+                  <a:srgbClr val="FF0000"/>
+                </a:solidFill>
+              </a:rPr>
+              <a:t>Modifying treatment in response to client performance. Stepping up to increase complexity/demands. Stepping down to provide more assistance, reduce complexity/demands in order for client to be successful</a:t>
             </a:r>
           </a:p>
         </p:txBody>
@@ -15356,6 +15434,41 @@
           </a:graphicData>
         </a:graphic>
       </p:graphicFrame>
+      <p:sp>
+        <p:nvSpPr>
+          <p:cNvPr id="3" name="TextBox 2">
+            <a:extLst>
+              <a:ext uri="{FF2B5EF4-FFF2-40B4-BE49-F238E27FC236}">
+                <a16:creationId xmlns:a16="http://schemas.microsoft.com/office/drawing/2014/main" id="{E3A6F819-91B0-CF5A-BF65-CD0DF604F17F}"/>
+              </a:ext>
+            </a:extLst>
+          </p:cNvPr>
+          <p:cNvSpPr txBox="1"/>
+          <p:nvPr/>
+        </p:nvSpPr>
+        <p:spPr>
+          <a:xfrm>
+            <a:off x="5757333" y="843240"/>
+            <a:ext cx="4568045" cy="369332"/>
+          </a:xfrm>
+          <a:prstGeom prst="rect">
+            <a:avLst/>
+          </a:prstGeom>
+          <a:noFill/>
+        </p:spPr>
+        <p:txBody>
+          <a:bodyPr wrap="none" rtlCol="0">
+            <a:spAutoFit/>
+          </a:bodyPr>
+          <a:lstStyle/>
+          <a:p>
+            <a:r>
+              <a:rPr lang="en-US" dirty="0"/>
+              <a:t>Clinician’s response to the client’s productions </a:t>
+            </a:r>
+          </a:p>
+        </p:txBody>
+      </p:sp>
     </p:spTree>
     <p:extLst>
       <p:ext uri="{BB962C8B-B14F-4D97-AF65-F5344CB8AC3E}">

</xml_diff>